<commit_message>
fixed typo in EclipseCon 2011 slides
</commit_message>
<xml_diff>
--- a/documentation/presentations/Dawn_EclipseCon_2011/Dawn_EclipseCon_2011.pptx
+++ b/documentation/presentations/Dawn_EclipseCon_2011/Dawn_EclipseCon_2011.pptx
@@ -204,7 +204,7 @@
             <a:fld id="{01F1399A-6279-467A-AFC4-7FDFDBD65377}" type="datetimeFigureOut">
               <a:rPr lang="de-DE" smtClean="0"/>
               <a:pPr/>
-              <a:t>04.04.2011</a:t>
+              <a:t>06.04.2011</a:t>
             </a:fld>
             <a:endParaRPr lang="en-US"/>
           </a:p>
@@ -366,7 +366,7 @@
             <a:fld id="{4EFD53E2-34CB-4AAB-9DD8-91E5E18A88A0}" type="datetimeFigureOut">
               <a:rPr lang="de-DE" smtClean="0"/>
               <a:pPr/>
-              <a:t>04.04.2011</a:t>
+              <a:t>06.04.2011</a:t>
             </a:fld>
             <a:endParaRPr lang="en-US"/>
           </a:p>
@@ -2596,7 +2596,7 @@
           <a:p>
             <a:pPr algn="ctr"/>
             <a:r>
-              <a:rPr lang="en-US" sz="2000" b="1" dirty="0" err="1" smtClean="0">
+              <a:rPr lang="en-US" sz="2000" b="1" dirty="0" smtClean="0">
                 <a:solidFill>
                   <a:schemeClr val="bg1">
                     <a:lumMod val="50000"/>
@@ -2605,7 +2605,7 @@
                 <a:latin typeface="Arial" pitchFamily="34" charset="0"/>
                 <a:cs typeface="Arial" pitchFamily="34" charset="0"/>
               </a:rPr>
-              <a:t>scaleable</a:t>
+              <a:t>scalable</a:t>
             </a:r>
             <a:endParaRPr lang="en-US" sz="2000" b="1" dirty="0" smtClean="0">
               <a:solidFill>

</xml_diff>